<commit_message>
changed link in presentation
</commit_message>
<xml_diff>
--- a/slides/conda_intro.pptx
+++ b/slides/conda_intro.pptx
@@ -315,6 +315,11 @@
       </a:defRPr>
     </a:lvl9pPr>
   </p:defaultTextStyle>
+  <p:extLst>
+    <p:ext uri="{EFAFB233-063F-42B5-8137-9DF3F51BA10A}">
+      <p15:sldGuideLst xmlns:p15="http://schemas.microsoft.com/office/powerpoint/2012/main"/>
+    </p:ext>
+  </p:extLst>
 </p:presentation>
 </file>
 
@@ -3244,7 +3249,7 @@
           </a:ln>
           <a:extLst>
             <a:ext uri="{C572A759-6A51-4108-AA02-DFA0A04FC94B}">
-              <ma14:wrappingTextBoxFlag xmlns:ma14="http://schemas.microsoft.com/office/mac/drawingml/2011/main" xmlns:a14="http://schemas.microsoft.com/office/drawing/2010/main" xmlns:m="http://schemas.openxmlformats.org/officeDocument/2006/math" xmlns="" val="1"/>
+              <ma14:wrappingTextBoxFlag xmlns="" xmlns:m="http://schemas.openxmlformats.org/officeDocument/2006/math" xmlns:a14="http://schemas.microsoft.com/office/drawing/2010/main" xmlns:ma14="http://schemas.microsoft.com/office/mac/drawingml/2011/main" val="1"/>
             </a:ext>
           </a:extLst>
         </p:spPr>
@@ -3283,7 +3288,7 @@
           </a:ln>
           <a:extLst>
             <a:ext uri="{C572A759-6A51-4108-AA02-DFA0A04FC94B}">
-              <ma14:wrappingTextBoxFlag xmlns:ma14="http://schemas.microsoft.com/office/mac/drawingml/2011/main" xmlns:a14="http://schemas.microsoft.com/office/drawing/2010/main" xmlns:m="http://schemas.openxmlformats.org/officeDocument/2006/math" xmlns="" val="1"/>
+              <ma14:wrappingTextBoxFlag xmlns="" xmlns:m="http://schemas.openxmlformats.org/officeDocument/2006/math" xmlns:a14="http://schemas.microsoft.com/office/drawing/2010/main" xmlns:ma14="http://schemas.microsoft.com/office/mac/drawingml/2011/main" val="1"/>
             </a:ext>
           </a:extLst>
         </p:spPr>
@@ -4253,7 +4258,7 @@
           </a:ln>
           <a:extLst>
             <a:ext uri="{C572A759-6A51-4108-AA02-DFA0A04FC94B}">
-              <ma14:wrappingTextBoxFlag xmlns:ma14="http://schemas.microsoft.com/office/mac/drawingml/2011/main" xmlns:a14="http://schemas.microsoft.com/office/drawing/2010/main" xmlns:m="http://schemas.openxmlformats.org/officeDocument/2006/math" xmlns="" val="1"/>
+              <ma14:wrappingTextBoxFlag xmlns="" xmlns:m="http://schemas.openxmlformats.org/officeDocument/2006/math" xmlns:a14="http://schemas.microsoft.com/office/drawing/2010/main" xmlns:ma14="http://schemas.microsoft.com/office/mac/drawingml/2011/main" val="1"/>
             </a:ext>
           </a:extLst>
         </p:spPr>
@@ -4488,7 +4493,7 @@
           </a:ln>
           <a:extLst>
             <a:ext uri="{C572A759-6A51-4108-AA02-DFA0A04FC94B}">
-              <ma14:wrappingTextBoxFlag xmlns:ma14="http://schemas.microsoft.com/office/mac/drawingml/2011/main" xmlns:a14="http://schemas.microsoft.com/office/drawing/2010/main" xmlns:m="http://schemas.openxmlformats.org/officeDocument/2006/math" xmlns="" val="1"/>
+              <ma14:wrappingTextBoxFlag xmlns="" xmlns:m="http://schemas.openxmlformats.org/officeDocument/2006/math" xmlns:a14="http://schemas.microsoft.com/office/drawing/2010/main" xmlns:ma14="http://schemas.microsoft.com/office/mac/drawingml/2011/main" val="1"/>
             </a:ext>
           </a:extLst>
         </p:spPr>
@@ -4858,7 +4863,7 @@
           </a:ln>
           <a:extLst>
             <a:ext uri="{C572A759-6A51-4108-AA02-DFA0A04FC94B}">
-              <ma14:wrappingTextBoxFlag xmlns:ma14="http://schemas.microsoft.com/office/mac/drawingml/2011/main" xmlns:a14="http://schemas.microsoft.com/office/drawing/2010/main" xmlns:m="http://schemas.openxmlformats.org/officeDocument/2006/math" xmlns="" val="1"/>
+              <ma14:wrappingTextBoxFlag xmlns="" xmlns:m="http://schemas.openxmlformats.org/officeDocument/2006/math" xmlns:a14="http://schemas.microsoft.com/office/drawing/2010/main" xmlns:ma14="http://schemas.microsoft.com/office/mac/drawingml/2011/main" val="1"/>
             </a:ext>
           </a:extLst>
         </p:spPr>
@@ -4947,7 +4952,7 @@
           </a:ln>
           <a:extLst>
             <a:ext uri="{C572A759-6A51-4108-AA02-DFA0A04FC94B}">
-              <ma14:wrappingTextBoxFlag xmlns:ma14="http://schemas.microsoft.com/office/mac/drawingml/2011/main" xmlns:a14="http://schemas.microsoft.com/office/drawing/2010/main" xmlns:m="http://schemas.openxmlformats.org/officeDocument/2006/math" xmlns="" val="1"/>
+              <ma14:wrappingTextBoxFlag xmlns="" xmlns:m="http://schemas.openxmlformats.org/officeDocument/2006/math" xmlns:a14="http://schemas.microsoft.com/office/drawing/2010/main" xmlns:ma14="http://schemas.microsoft.com/office/mac/drawingml/2011/main" val="1"/>
             </a:ext>
           </a:extLst>
         </p:spPr>
@@ -5312,7 +5317,7 @@
           </a:ln>
           <a:extLst>
             <a:ext uri="{C572A759-6A51-4108-AA02-DFA0A04FC94B}">
-              <ma14:wrappingTextBoxFlag xmlns:ma14="http://schemas.microsoft.com/office/mac/drawingml/2011/main" xmlns:a14="http://schemas.microsoft.com/office/drawing/2010/main" xmlns:m="http://schemas.openxmlformats.org/officeDocument/2006/math" xmlns="" val="1"/>
+              <ma14:wrappingTextBoxFlag xmlns="" xmlns:m="http://schemas.openxmlformats.org/officeDocument/2006/math" xmlns:a14="http://schemas.microsoft.com/office/drawing/2010/main" xmlns:ma14="http://schemas.microsoft.com/office/mac/drawingml/2011/main" val="1"/>
             </a:ext>
           </a:extLst>
         </p:spPr>
@@ -5456,7 +5461,7 @@
           </a:ln>
           <a:extLst>
             <a:ext uri="{C572A759-6A51-4108-AA02-DFA0A04FC94B}">
-              <ma14:wrappingTextBoxFlag xmlns:ma14="http://schemas.microsoft.com/office/mac/drawingml/2011/main" xmlns:a14="http://schemas.microsoft.com/office/drawing/2010/main" xmlns:m="http://schemas.openxmlformats.org/officeDocument/2006/math" xmlns="" val="1"/>
+              <ma14:wrappingTextBoxFlag xmlns="" xmlns:m="http://schemas.openxmlformats.org/officeDocument/2006/math" xmlns:a14="http://schemas.microsoft.com/office/drawing/2010/main" xmlns:ma14="http://schemas.microsoft.com/office/mac/drawingml/2011/main" val="1"/>
             </a:ext>
           </a:extLst>
         </p:spPr>
@@ -5683,7 +5688,7 @@
           </a:ln>
           <a:extLst>
             <a:ext uri="{C572A759-6A51-4108-AA02-DFA0A04FC94B}">
-              <ma14:wrappingTextBoxFlag xmlns:ma14="http://schemas.microsoft.com/office/mac/drawingml/2011/main" xmlns:a14="http://schemas.microsoft.com/office/drawing/2010/main" xmlns:m="http://schemas.openxmlformats.org/officeDocument/2006/math" xmlns="" val="1"/>
+              <ma14:wrappingTextBoxFlag xmlns="" xmlns:m="http://schemas.openxmlformats.org/officeDocument/2006/math" xmlns:a14="http://schemas.microsoft.com/office/drawing/2010/main" xmlns:ma14="http://schemas.microsoft.com/office/mac/drawingml/2011/main" val="1"/>
             </a:ext>
           </a:extLst>
         </p:spPr>
@@ -6161,7 +6166,7 @@
           </a:ln>
           <a:extLst>
             <a:ext uri="{C572A759-6A51-4108-AA02-DFA0A04FC94B}">
-              <ma14:wrappingTextBoxFlag xmlns:ma14="http://schemas.microsoft.com/office/mac/drawingml/2011/main" xmlns:a14="http://schemas.microsoft.com/office/drawing/2010/main" xmlns:m="http://schemas.openxmlformats.org/officeDocument/2006/math" xmlns="" val="1"/>
+              <ma14:wrappingTextBoxFlag xmlns="" xmlns:m="http://schemas.openxmlformats.org/officeDocument/2006/math" xmlns:a14="http://schemas.microsoft.com/office/drawing/2010/main" xmlns:ma14="http://schemas.microsoft.com/office/mac/drawingml/2011/main" val="1"/>
             </a:ext>
           </a:extLst>
         </p:spPr>
@@ -6220,12 +6225,46 @@
               </a:defRPr>
             </a:pPr>
             <a:r>
-              <a:rPr dirty="0">
-                <a:hlinkClick r:id="rId2"/>
-              </a:rPr>
-              <a:t>https://github.com/ELELAB/environments_workshop/conda</a:t>
-            </a:r>
-            <a:endParaRPr lang="en-GB" dirty="0"/>
+              <a:rPr lang="en-GB" dirty="0"/>
+              <a:t>https://</a:t>
+            </a:r>
+            <a:r>
+              <a:rPr lang="en-GB" dirty="0" err="1"/>
+              <a:t>github.com</a:t>
+            </a:r>
+            <a:r>
+              <a:rPr lang="en-GB" dirty="0"/>
+              <a:t>/ELELAB/</a:t>
+            </a:r>
+            <a:r>
+              <a:rPr lang="en-GB" dirty="0" err="1"/>
+              <a:t>environments_workshop</a:t>
+            </a:r>
+            <a:r>
+              <a:rPr lang="en-GB" dirty="0"/>
+              <a:t>/blob/main/</a:t>
+            </a:r>
+            <a:r>
+              <a:rPr lang="en-GB" dirty="0" err="1"/>
+              <a:t>conda</a:t>
+            </a:r>
+            <a:r>
+              <a:rPr lang="en-GB" dirty="0"/>
+              <a:t>/</a:t>
+            </a:r>
+            <a:r>
+              <a:rPr lang="en-GB" dirty="0" err="1"/>
+              <a:t>conda.md</a:t>
+            </a:r>
+            <a:endParaRPr lang="en-GB" sz="1200">
+              <a:solidFill>
+                <a:srgbClr val="000000"/>
+              </a:solidFill>
+              <a:latin typeface="Times Roman"/>
+              <a:ea typeface="Times Roman"/>
+              <a:cs typeface="Times Roman"/>
+              <a:sym typeface="Times Roman"/>
+            </a:endParaRPr>
           </a:p>
           <a:p>
             <a:pPr algn="l" defTabSz="457200">
@@ -6349,7 +6388,7 @@
             </a:pPr>
             <a:r>
               <a:rPr dirty="0">
-                <a:hlinkClick r:id="rId3"/>
+                <a:hlinkClick r:id="rId2"/>
               </a:rPr>
               <a:t>https://docs.conda.io/projects/conda/en/latest/glossary.html#miniconda-glossary</a:t>
             </a:r>
@@ -6385,7 +6424,7 @@
             </a:pPr>
             <a:r>
               <a:rPr dirty="0">
-                <a:hlinkClick r:id="rId4"/>
+                <a:hlinkClick r:id="rId3"/>
               </a:rPr>
               <a:t>https://bioconda.github.io/</a:t>
             </a:r>
@@ -6421,7 +6460,7 @@
             </a:pPr>
             <a:r>
               <a:rPr dirty="0">
-                <a:hlinkClick r:id="rId5"/>
+                <a:hlinkClick r:id="rId4"/>
               </a:rPr>
               <a:t>https://conda-forge.org/</a:t>
             </a:r>

</xml_diff>